<commit_message>
almost completed last iteration of the report
</commit_message>
<xml_diff>
--- a/report/figures/errorsAndSubmit.pptx
+++ b/report/figures/errorsAndSubmit.pptx
@@ -107,6 +107,11 @@
       </a:defRPr>
     </a:lvl9pPr>
   </p:defaultTextStyle>
+  <p:extLst>
+    <p:ext uri="{EFAFB233-063F-42B5-8137-9DF3F51BA10A}">
+      <p15:sldGuideLst xmlns:p15="http://schemas.microsoft.com/office/powerpoint/2012/main"/>
+    </p:ext>
+  </p:extLst>
 </p:presentation>
 </file>
 
@@ -192,7 +197,7 @@
           <a:p>
             <a:fld id="{DCDCBA0A-EFFC-AE45-BA64-2DEC56E89393}" type="datetimeFigureOut">
               <a:rPr lang="en-GB" smtClean="0"/>
-              <a:t>08/06/2017</a:t>
+              <a:t>18/06/2017</a:t>
             </a:fld>
             <a:endParaRPr lang="en-GB"/>
           </a:p>
@@ -591,7 +596,7 @@
           <a:p>
             <a:fld id="{14AAE40B-300C-F148-AD94-8049F361AD0D}" type="datetimeFigureOut">
               <a:rPr lang="en-GB" smtClean="0"/>
-              <a:t>08/06/2017</a:t>
+              <a:t>18/06/2017</a:t>
             </a:fld>
             <a:endParaRPr lang="en-GB"/>
           </a:p>
@@ -761,7 +766,7 @@
           <a:p>
             <a:fld id="{14AAE40B-300C-F148-AD94-8049F361AD0D}" type="datetimeFigureOut">
               <a:rPr lang="en-GB" smtClean="0"/>
-              <a:t>08/06/2017</a:t>
+              <a:t>18/06/2017</a:t>
             </a:fld>
             <a:endParaRPr lang="en-GB"/>
           </a:p>
@@ -941,7 +946,7 @@
           <a:p>
             <a:fld id="{14AAE40B-300C-F148-AD94-8049F361AD0D}" type="datetimeFigureOut">
               <a:rPr lang="en-GB" smtClean="0"/>
-              <a:t>08/06/2017</a:t>
+              <a:t>18/06/2017</a:t>
             </a:fld>
             <a:endParaRPr lang="en-GB"/>
           </a:p>
@@ -1111,7 +1116,7 @@
           <a:p>
             <a:fld id="{14AAE40B-300C-F148-AD94-8049F361AD0D}" type="datetimeFigureOut">
               <a:rPr lang="en-GB" smtClean="0"/>
-              <a:t>08/06/2017</a:t>
+              <a:t>18/06/2017</a:t>
             </a:fld>
             <a:endParaRPr lang="en-GB"/>
           </a:p>
@@ -1357,7 +1362,7 @@
           <a:p>
             <a:fld id="{14AAE40B-300C-F148-AD94-8049F361AD0D}" type="datetimeFigureOut">
               <a:rPr lang="en-GB" smtClean="0"/>
-              <a:t>08/06/2017</a:t>
+              <a:t>18/06/2017</a:t>
             </a:fld>
             <a:endParaRPr lang="en-GB"/>
           </a:p>
@@ -1589,7 +1594,7 @@
           <a:p>
             <a:fld id="{14AAE40B-300C-F148-AD94-8049F361AD0D}" type="datetimeFigureOut">
               <a:rPr lang="en-GB" smtClean="0"/>
-              <a:t>08/06/2017</a:t>
+              <a:t>18/06/2017</a:t>
             </a:fld>
             <a:endParaRPr lang="en-GB"/>
           </a:p>
@@ -1956,7 +1961,7 @@
           <a:p>
             <a:fld id="{14AAE40B-300C-F148-AD94-8049F361AD0D}" type="datetimeFigureOut">
               <a:rPr lang="en-GB" smtClean="0"/>
-              <a:t>08/06/2017</a:t>
+              <a:t>18/06/2017</a:t>
             </a:fld>
             <a:endParaRPr lang="en-GB"/>
           </a:p>
@@ -2074,7 +2079,7 @@
           <a:p>
             <a:fld id="{14AAE40B-300C-F148-AD94-8049F361AD0D}" type="datetimeFigureOut">
               <a:rPr lang="en-GB" smtClean="0"/>
-              <a:t>08/06/2017</a:t>
+              <a:t>18/06/2017</a:t>
             </a:fld>
             <a:endParaRPr lang="en-GB"/>
           </a:p>
@@ -2169,7 +2174,7 @@
           <a:p>
             <a:fld id="{14AAE40B-300C-F148-AD94-8049F361AD0D}" type="datetimeFigureOut">
               <a:rPr lang="en-GB" smtClean="0"/>
-              <a:t>08/06/2017</a:t>
+              <a:t>18/06/2017</a:t>
             </a:fld>
             <a:endParaRPr lang="en-GB"/>
           </a:p>
@@ -2446,7 +2451,7 @@
           <a:p>
             <a:fld id="{14AAE40B-300C-F148-AD94-8049F361AD0D}" type="datetimeFigureOut">
               <a:rPr lang="en-GB" smtClean="0"/>
-              <a:t>08/06/2017</a:t>
+              <a:t>18/06/2017</a:t>
             </a:fld>
             <a:endParaRPr lang="en-GB"/>
           </a:p>
@@ -2699,7 +2704,7 @@
           <a:p>
             <a:fld id="{14AAE40B-300C-F148-AD94-8049F361AD0D}" type="datetimeFigureOut">
               <a:rPr lang="en-GB" smtClean="0"/>
-              <a:t>08/06/2017</a:t>
+              <a:t>18/06/2017</a:t>
             </a:fld>
             <a:endParaRPr lang="en-GB"/>
           </a:p>
@@ -2912,7 +2917,7 @@
           <a:p>
             <a:fld id="{14AAE40B-300C-F148-AD94-8049F361AD0D}" type="datetimeFigureOut">
               <a:rPr lang="en-GB" smtClean="0"/>
-              <a:t>08/06/2017</a:t>
+              <a:t>18/06/2017</a:t>
             </a:fld>
             <a:endParaRPr lang="en-GB"/>
           </a:p>
@@ -3340,7 +3345,7 @@
         <p:spPr>
           <a:xfrm>
             <a:off x="849746" y="544946"/>
-            <a:ext cx="7404100" cy="1155700"/>
+            <a:ext cx="5523345" cy="862135"/>
           </a:xfrm>
           <a:prstGeom prst="rect">
             <a:avLst/>
@@ -3370,7 +3375,7 @@
         <p:spPr>
           <a:xfrm>
             <a:off x="4260273" y="1932710"/>
-            <a:ext cx="7442200" cy="889000"/>
+            <a:ext cx="5548745" cy="662819"/>
           </a:xfrm>
           <a:prstGeom prst="rect">
             <a:avLst/>
@@ -3400,7 +3405,7 @@
         <p:spPr>
           <a:xfrm>
             <a:off x="767196" y="3066469"/>
-            <a:ext cx="7569200" cy="1003300"/>
+            <a:ext cx="5993822" cy="794483"/>
           </a:xfrm>
           <a:prstGeom prst="rect">
             <a:avLst/>
@@ -3429,8 +3434,8 @@
         </p:blipFill>
         <p:spPr>
           <a:xfrm>
-            <a:off x="4171373" y="4314530"/>
-            <a:ext cx="7531100" cy="1193800"/>
+            <a:off x="4260273" y="4290327"/>
+            <a:ext cx="5877675" cy="948012"/>
           </a:xfrm>
           <a:prstGeom prst="rect">
             <a:avLst/>

</xml_diff>